<commit_message>
Präsentation und Integrationstests aktualisiert
</commit_message>
<xml_diff>
--- a/Sonstiges/PräsentationSoftBed.pptx
+++ b/Sonstiges/PräsentationSoftBed.pptx
@@ -544,6 +544,90 @@
     <p:extLst>
       <p:ext uri="{BB962C8B-B14F-4D97-AF65-F5344CB8AC3E}">
         <p14:creationId xmlns:p14="http://schemas.microsoft.com/office/powerpoint/2010/main" val="2788583688"/>
+      </p:ext>
+    </p:extLst>
+  </p:cSld>
+  <p:clrMapOvr>
+    <a:masterClrMapping/>
+  </p:clrMapOvr>
+</p:notes>
+</file>
+
+<file path=ppt/notesSlides/notesSlide2.xml><?xml version="1.0" encoding="utf-8"?>
+<p:notes xmlns:a="http://schemas.openxmlformats.org/drawingml/2006/main" xmlns:r="http://schemas.openxmlformats.org/officeDocument/2006/relationships" xmlns:p="http://schemas.openxmlformats.org/presentationml/2006/main">
+  <p:cSld>
+    <p:spTree>
+      <p:nvGrpSpPr>
+        <p:cNvPr id="1" name=""/>
+        <p:cNvGrpSpPr/>
+        <p:nvPr/>
+      </p:nvGrpSpPr>
+      <p:grpSpPr>
+        <a:xfrm>
+          <a:off x="0" y="0"/>
+          <a:ext cx="0" cy="0"/>
+          <a:chOff x="0" y="0"/>
+          <a:chExt cx="0" cy="0"/>
+        </a:xfrm>
+      </p:grpSpPr>
+      <p:sp>
+        <p:nvSpPr>
+          <p:cNvPr id="2" name="Folienbildplatzhalter 1"/>
+          <p:cNvSpPr>
+            <a:spLocks noGrp="1" noRot="1" noChangeAspect="1"/>
+          </p:cNvSpPr>
+          <p:nvPr>
+            <p:ph type="sldImg"/>
+          </p:nvPr>
+        </p:nvSpPr>
+        <p:spPr/>
+      </p:sp>
+      <p:sp>
+        <p:nvSpPr>
+          <p:cNvPr id="3" name="Notizenplatzhalter 2"/>
+          <p:cNvSpPr>
+            <a:spLocks noGrp="1"/>
+          </p:cNvSpPr>
+          <p:nvPr>
+            <p:ph type="body" idx="1"/>
+          </p:nvPr>
+        </p:nvSpPr>
+        <p:spPr/>
+        <p:txBody>
+          <a:bodyPr/>
+          <a:lstStyle/>
+          <a:p>
+            <a:endParaRPr lang="de-DE" dirty="0"/>
+          </a:p>
+        </p:txBody>
+      </p:sp>
+      <p:sp>
+        <p:nvSpPr>
+          <p:cNvPr id="4" name="Foliennummernplatzhalter 3"/>
+          <p:cNvSpPr>
+            <a:spLocks noGrp="1"/>
+          </p:cNvSpPr>
+          <p:nvPr>
+            <p:ph type="sldNum" sz="quarter" idx="10"/>
+          </p:nvPr>
+        </p:nvSpPr>
+        <p:spPr/>
+        <p:txBody>
+          <a:bodyPr/>
+          <a:lstStyle/>
+          <a:p>
+            <a:fld id="{936179FC-EF85-45F3-906D-42B3B8F757C4}" type="slidenum">
+              <a:rPr lang="de-DE" smtClean="0"/>
+              <a:t>9</a:t>
+            </a:fld>
+            <a:endParaRPr lang="de-DE"/>
+          </a:p>
+        </p:txBody>
+      </p:sp>
+    </p:spTree>
+    <p:extLst>
+      <p:ext uri="{BB962C8B-B14F-4D97-AF65-F5344CB8AC3E}">
+        <p14:creationId xmlns:p14="http://schemas.microsoft.com/office/powerpoint/2010/main" val="3202810485"/>
       </p:ext>
     </p:extLst>
   </p:cSld>
@@ -4567,16 +4651,35 @@
             <p:ph type="sldNum" sz="quarter" idx="12"/>
           </p:nvPr>
         </p:nvSpPr>
-        <p:spPr/>
+        <p:spPr>
+          <a:xfrm>
+            <a:off x="8460431" y="6309320"/>
+            <a:ext cx="666315" cy="365125"/>
+          </a:xfrm>
+        </p:spPr>
         <p:txBody>
           <a:bodyPr/>
           <a:lstStyle/>
           <a:p>
             <a:fld id="{80A02E86-5D94-48B3-A556-A0859BE28805}" type="slidenum">
-              <a:rPr lang="de-DE" smtClean="0"/>
+              <a:rPr lang="de-DE" smtClean="0">
+                <a:solidFill>
+                  <a:schemeClr val="tx1">
+                    <a:lumMod val="50000"/>
+                    <a:lumOff val="50000"/>
+                  </a:schemeClr>
+                </a:solidFill>
+              </a:rPr>
               <a:t>1</a:t>
             </a:fld>
-            <a:endParaRPr lang="de-DE"/>
+            <a:endParaRPr lang="de-DE" dirty="0">
+              <a:solidFill>
+                <a:schemeClr val="tx1">
+                  <a:lumMod val="50000"/>
+                  <a:lumOff val="50000"/>
+                </a:schemeClr>
+              </a:solidFill>
+            </a:endParaRPr>
           </a:p>
         </p:txBody>
       </p:sp>
@@ -4724,48 +4827,6 @@
           </a:p>
         </p:txBody>
       </p:sp>
-      <p:sp>
-        <p:nvSpPr>
-          <p:cNvPr id="4" name="Foliennummernplatzhalter 3"/>
-          <p:cNvSpPr>
-            <a:spLocks noGrp="1"/>
-          </p:cNvSpPr>
-          <p:nvPr>
-            <p:ph type="sldNum" sz="quarter" idx="12"/>
-          </p:nvPr>
-        </p:nvSpPr>
-        <p:spPr>
-          <a:xfrm>
-            <a:off x="8388424" y="6492875"/>
-            <a:ext cx="2133600" cy="365125"/>
-          </a:xfrm>
-        </p:spPr>
-        <p:txBody>
-          <a:bodyPr/>
-          <a:lstStyle/>
-          <a:p>
-            <a:fld id="{80A02E86-5D94-48B3-A556-A0859BE28805}" type="slidenum">
-              <a:rPr lang="de-DE" smtClean="0">
-                <a:solidFill>
-                  <a:schemeClr val="tx1">
-                    <a:lumMod val="50000"/>
-                    <a:lumOff val="50000"/>
-                  </a:schemeClr>
-                </a:solidFill>
-              </a:rPr>
-              <a:t>10</a:t>
-            </a:fld>
-            <a:endParaRPr lang="de-DE">
-              <a:solidFill>
-                <a:schemeClr val="tx1">
-                  <a:lumMod val="50000"/>
-                  <a:lumOff val="50000"/>
-                </a:schemeClr>
-              </a:solidFill>
-            </a:endParaRPr>
-          </a:p>
-        </p:txBody>
-      </p:sp>
       <p:pic>
         <p:nvPicPr>
           <p:cNvPr id="2050" name="Picture 2" descr="F:\Dokumente\Uni bzw. Hochschule\Hochschule Offenburg\AI4_SS2019\Projekt 1\Logo_1.png"/>
@@ -4807,6 +4868,144 @@
           </a:extLst>
         </p:spPr>
       </p:pic>
+      <p:sp>
+        <p:nvSpPr>
+          <p:cNvPr id="14" name="Foliennummernplatzhalter 3"/>
+          <p:cNvSpPr txBox="1">
+            <a:spLocks/>
+          </p:cNvSpPr>
+          <p:nvPr/>
+        </p:nvSpPr>
+        <p:spPr>
+          <a:xfrm>
+            <a:off x="8460431" y="6480855"/>
+            <a:ext cx="666315" cy="365125"/>
+          </a:xfrm>
+          <a:prstGeom prst="rect">
+            <a:avLst/>
+          </a:prstGeom>
+        </p:spPr>
+        <p:txBody>
+          <a:bodyPr/>
+          <a:lstStyle>
+            <a:defPPr>
+              <a:defRPr lang="de-DE"/>
+            </a:defPPr>
+            <a:lvl1pPr marL="0" algn="l" defTabSz="914400" rtl="0" eaLnBrk="1" latinLnBrk="0" hangingPunct="1">
+              <a:defRPr sz="1800" kern="1200">
+                <a:solidFill>
+                  <a:schemeClr val="tx1"/>
+                </a:solidFill>
+                <a:latin typeface="+mn-lt"/>
+                <a:ea typeface="+mn-ea"/>
+                <a:cs typeface="+mn-cs"/>
+              </a:defRPr>
+            </a:lvl1pPr>
+            <a:lvl2pPr marL="457200" algn="l" defTabSz="914400" rtl="0" eaLnBrk="1" latinLnBrk="0" hangingPunct="1">
+              <a:defRPr sz="1800" kern="1200">
+                <a:solidFill>
+                  <a:schemeClr val="tx1"/>
+                </a:solidFill>
+                <a:latin typeface="+mn-lt"/>
+                <a:ea typeface="+mn-ea"/>
+                <a:cs typeface="+mn-cs"/>
+              </a:defRPr>
+            </a:lvl2pPr>
+            <a:lvl3pPr marL="914400" algn="l" defTabSz="914400" rtl="0" eaLnBrk="1" latinLnBrk="0" hangingPunct="1">
+              <a:defRPr sz="1800" kern="1200">
+                <a:solidFill>
+                  <a:schemeClr val="tx1"/>
+                </a:solidFill>
+                <a:latin typeface="+mn-lt"/>
+                <a:ea typeface="+mn-ea"/>
+                <a:cs typeface="+mn-cs"/>
+              </a:defRPr>
+            </a:lvl3pPr>
+            <a:lvl4pPr marL="1371600" algn="l" defTabSz="914400" rtl="0" eaLnBrk="1" latinLnBrk="0" hangingPunct="1">
+              <a:defRPr sz="1800" kern="1200">
+                <a:solidFill>
+                  <a:schemeClr val="tx1"/>
+                </a:solidFill>
+                <a:latin typeface="+mn-lt"/>
+                <a:ea typeface="+mn-ea"/>
+                <a:cs typeface="+mn-cs"/>
+              </a:defRPr>
+            </a:lvl4pPr>
+            <a:lvl5pPr marL="1828800" algn="l" defTabSz="914400" rtl="0" eaLnBrk="1" latinLnBrk="0" hangingPunct="1">
+              <a:defRPr sz="1800" kern="1200">
+                <a:solidFill>
+                  <a:schemeClr val="tx1"/>
+                </a:solidFill>
+                <a:latin typeface="+mn-lt"/>
+                <a:ea typeface="+mn-ea"/>
+                <a:cs typeface="+mn-cs"/>
+              </a:defRPr>
+            </a:lvl5pPr>
+            <a:lvl6pPr marL="2286000" algn="l" defTabSz="914400" rtl="0" eaLnBrk="1" latinLnBrk="0" hangingPunct="1">
+              <a:defRPr sz="1800" kern="1200">
+                <a:solidFill>
+                  <a:schemeClr val="tx1"/>
+                </a:solidFill>
+                <a:latin typeface="+mn-lt"/>
+                <a:ea typeface="+mn-ea"/>
+                <a:cs typeface="+mn-cs"/>
+              </a:defRPr>
+            </a:lvl6pPr>
+            <a:lvl7pPr marL="2743200" algn="l" defTabSz="914400" rtl="0" eaLnBrk="1" latinLnBrk="0" hangingPunct="1">
+              <a:defRPr sz="1800" kern="1200">
+                <a:solidFill>
+                  <a:schemeClr val="tx1"/>
+                </a:solidFill>
+                <a:latin typeface="+mn-lt"/>
+                <a:ea typeface="+mn-ea"/>
+                <a:cs typeface="+mn-cs"/>
+              </a:defRPr>
+            </a:lvl7pPr>
+            <a:lvl8pPr marL="3200400" algn="l" defTabSz="914400" rtl="0" eaLnBrk="1" latinLnBrk="0" hangingPunct="1">
+              <a:defRPr sz="1800" kern="1200">
+                <a:solidFill>
+                  <a:schemeClr val="tx1"/>
+                </a:solidFill>
+                <a:latin typeface="+mn-lt"/>
+                <a:ea typeface="+mn-ea"/>
+                <a:cs typeface="+mn-cs"/>
+              </a:defRPr>
+            </a:lvl8pPr>
+            <a:lvl9pPr marL="3657600" algn="l" defTabSz="914400" rtl="0" eaLnBrk="1" latinLnBrk="0" hangingPunct="1">
+              <a:defRPr sz="1800" kern="1200">
+                <a:solidFill>
+                  <a:schemeClr val="tx1"/>
+                </a:solidFill>
+                <a:latin typeface="+mn-lt"/>
+                <a:ea typeface="+mn-ea"/>
+                <a:cs typeface="+mn-cs"/>
+              </a:defRPr>
+            </a:lvl9pPr>
+          </a:lstStyle>
+          <a:p>
+            <a:fld id="{80A02E86-5D94-48B3-A556-A0859BE28805}" type="slidenum">
+              <a:rPr lang="de-DE" sz="1400" smtClean="0">
+                <a:solidFill>
+                  <a:schemeClr val="tx1">
+                    <a:lumMod val="50000"/>
+                    <a:lumOff val="50000"/>
+                  </a:schemeClr>
+                </a:solidFill>
+              </a:rPr>
+              <a:pPr/>
+              <a:t>10</a:t>
+            </a:fld>
+            <a:endParaRPr lang="de-DE" sz="1400" dirty="0">
+              <a:solidFill>
+                <a:schemeClr val="tx1">
+                  <a:lumMod val="50000"/>
+                  <a:lumOff val="50000"/>
+                </a:schemeClr>
+              </a:solidFill>
+            </a:endParaRPr>
+          </a:p>
+        </p:txBody>
+      </p:sp>
     </p:spTree>
     <p:extLst>
       <p:ext uri="{BB962C8B-B14F-4D97-AF65-F5344CB8AC3E}">
@@ -4917,10 +5116,9 @@
               <a:buAutoNum type="arabicPeriod"/>
             </a:pPr>
             <a:r>
-              <a:rPr lang="de-DE" sz="2000" smtClean="0"/>
+              <a:rPr lang="de-DE" sz="2000" dirty="0" smtClean="0"/>
               <a:t>Lern-Fazit</a:t>
             </a:r>
-            <a:endParaRPr lang="de-DE" sz="2000" dirty="0" smtClean="0"/>
           </a:p>
           <a:p>
             <a:pPr marL="457200" indent="-457200">
@@ -4944,21 +5142,121 @@
       </p:sp>
       <p:sp>
         <p:nvSpPr>
-          <p:cNvPr id="4" name="Foliennummernplatzhalter 3"/>
-          <p:cNvSpPr>
-            <a:spLocks noGrp="1"/>
-          </p:cNvSpPr>
-          <p:nvPr>
-            <p:ph type="sldNum" sz="quarter" idx="12"/>
-          </p:nvPr>
-        </p:nvSpPr>
-        <p:spPr/>
+          <p:cNvPr id="5" name="Foliennummernplatzhalter 3"/>
+          <p:cNvSpPr txBox="1">
+            <a:spLocks/>
+          </p:cNvSpPr>
+          <p:nvPr/>
+        </p:nvSpPr>
+        <p:spPr>
+          <a:xfrm>
+            <a:off x="8460431" y="6480855"/>
+            <a:ext cx="666315" cy="365125"/>
+          </a:xfrm>
+          <a:prstGeom prst="rect">
+            <a:avLst/>
+          </a:prstGeom>
+        </p:spPr>
         <p:txBody>
           <a:bodyPr/>
-          <a:lstStyle/>
+          <a:lstStyle>
+            <a:defPPr>
+              <a:defRPr lang="de-DE"/>
+            </a:defPPr>
+            <a:lvl1pPr marL="0" algn="l" defTabSz="914400" rtl="0" eaLnBrk="1" latinLnBrk="0" hangingPunct="1">
+              <a:defRPr sz="1800" kern="1200">
+                <a:solidFill>
+                  <a:schemeClr val="tx1"/>
+                </a:solidFill>
+                <a:latin typeface="+mn-lt"/>
+                <a:ea typeface="+mn-ea"/>
+                <a:cs typeface="+mn-cs"/>
+              </a:defRPr>
+            </a:lvl1pPr>
+            <a:lvl2pPr marL="457200" algn="l" defTabSz="914400" rtl="0" eaLnBrk="1" latinLnBrk="0" hangingPunct="1">
+              <a:defRPr sz="1800" kern="1200">
+                <a:solidFill>
+                  <a:schemeClr val="tx1"/>
+                </a:solidFill>
+                <a:latin typeface="+mn-lt"/>
+                <a:ea typeface="+mn-ea"/>
+                <a:cs typeface="+mn-cs"/>
+              </a:defRPr>
+            </a:lvl2pPr>
+            <a:lvl3pPr marL="914400" algn="l" defTabSz="914400" rtl="0" eaLnBrk="1" latinLnBrk="0" hangingPunct="1">
+              <a:defRPr sz="1800" kern="1200">
+                <a:solidFill>
+                  <a:schemeClr val="tx1"/>
+                </a:solidFill>
+                <a:latin typeface="+mn-lt"/>
+                <a:ea typeface="+mn-ea"/>
+                <a:cs typeface="+mn-cs"/>
+              </a:defRPr>
+            </a:lvl3pPr>
+            <a:lvl4pPr marL="1371600" algn="l" defTabSz="914400" rtl="0" eaLnBrk="1" latinLnBrk="0" hangingPunct="1">
+              <a:defRPr sz="1800" kern="1200">
+                <a:solidFill>
+                  <a:schemeClr val="tx1"/>
+                </a:solidFill>
+                <a:latin typeface="+mn-lt"/>
+                <a:ea typeface="+mn-ea"/>
+                <a:cs typeface="+mn-cs"/>
+              </a:defRPr>
+            </a:lvl4pPr>
+            <a:lvl5pPr marL="1828800" algn="l" defTabSz="914400" rtl="0" eaLnBrk="1" latinLnBrk="0" hangingPunct="1">
+              <a:defRPr sz="1800" kern="1200">
+                <a:solidFill>
+                  <a:schemeClr val="tx1"/>
+                </a:solidFill>
+                <a:latin typeface="+mn-lt"/>
+                <a:ea typeface="+mn-ea"/>
+                <a:cs typeface="+mn-cs"/>
+              </a:defRPr>
+            </a:lvl5pPr>
+            <a:lvl6pPr marL="2286000" algn="l" defTabSz="914400" rtl="0" eaLnBrk="1" latinLnBrk="0" hangingPunct="1">
+              <a:defRPr sz="1800" kern="1200">
+                <a:solidFill>
+                  <a:schemeClr val="tx1"/>
+                </a:solidFill>
+                <a:latin typeface="+mn-lt"/>
+                <a:ea typeface="+mn-ea"/>
+                <a:cs typeface="+mn-cs"/>
+              </a:defRPr>
+            </a:lvl6pPr>
+            <a:lvl7pPr marL="2743200" algn="l" defTabSz="914400" rtl="0" eaLnBrk="1" latinLnBrk="0" hangingPunct="1">
+              <a:defRPr sz="1800" kern="1200">
+                <a:solidFill>
+                  <a:schemeClr val="tx1"/>
+                </a:solidFill>
+                <a:latin typeface="+mn-lt"/>
+                <a:ea typeface="+mn-ea"/>
+                <a:cs typeface="+mn-cs"/>
+              </a:defRPr>
+            </a:lvl7pPr>
+            <a:lvl8pPr marL="3200400" algn="l" defTabSz="914400" rtl="0" eaLnBrk="1" latinLnBrk="0" hangingPunct="1">
+              <a:defRPr sz="1800" kern="1200">
+                <a:solidFill>
+                  <a:schemeClr val="tx1"/>
+                </a:solidFill>
+                <a:latin typeface="+mn-lt"/>
+                <a:ea typeface="+mn-ea"/>
+                <a:cs typeface="+mn-cs"/>
+              </a:defRPr>
+            </a:lvl8pPr>
+            <a:lvl9pPr marL="3657600" algn="l" defTabSz="914400" rtl="0" eaLnBrk="1" latinLnBrk="0" hangingPunct="1">
+              <a:defRPr sz="1800" kern="1200">
+                <a:solidFill>
+                  <a:schemeClr val="tx1"/>
+                </a:solidFill>
+                <a:latin typeface="+mn-lt"/>
+                <a:ea typeface="+mn-ea"/>
+                <a:cs typeface="+mn-cs"/>
+              </a:defRPr>
+            </a:lvl9pPr>
+          </a:lstStyle>
           <a:p>
             <a:fld id="{80A02E86-5D94-48B3-A556-A0859BE28805}" type="slidenum">
-              <a:rPr lang="de-DE" sz="1600" smtClean="0">
+              <a:rPr lang="de-DE" sz="1400" smtClean="0">
                 <a:solidFill>
                   <a:schemeClr val="tx1">
                     <a:lumMod val="50000"/>
@@ -4966,9 +5264,10 @@
                   </a:schemeClr>
                 </a:solidFill>
               </a:rPr>
+              <a:pPr/>
               <a:t>2</a:t>
             </a:fld>
-            <a:endParaRPr lang="de-DE" sz="1600" dirty="0">
+            <a:endParaRPr lang="de-DE" sz="1400" dirty="0">
               <a:solidFill>
                 <a:schemeClr val="tx1">
                   <a:lumMod val="50000"/>
@@ -5157,23 +5456,118 @@
       </p:sp>
       <p:sp>
         <p:nvSpPr>
-          <p:cNvPr id="4" name="Foliennummernplatzhalter 3"/>
-          <p:cNvSpPr>
-            <a:spLocks noGrp="1"/>
-          </p:cNvSpPr>
-          <p:nvPr>
-            <p:ph type="sldNum" sz="quarter" idx="12"/>
-          </p:nvPr>
-        </p:nvSpPr>
-        <p:spPr>
-          <a:xfrm>
-            <a:off x="8748464" y="6525344"/>
-            <a:ext cx="288032" cy="365125"/>
-          </a:xfrm>
+          <p:cNvPr id="5" name="Foliennummernplatzhalter 3"/>
+          <p:cNvSpPr txBox="1">
+            <a:spLocks/>
+          </p:cNvSpPr>
+          <p:nvPr/>
+        </p:nvSpPr>
+        <p:spPr>
+          <a:xfrm>
+            <a:off x="8460431" y="6480855"/>
+            <a:ext cx="666315" cy="365125"/>
+          </a:xfrm>
+          <a:prstGeom prst="rect">
+            <a:avLst/>
+          </a:prstGeom>
         </p:spPr>
         <p:txBody>
           <a:bodyPr/>
-          <a:lstStyle/>
+          <a:lstStyle>
+            <a:defPPr>
+              <a:defRPr lang="de-DE"/>
+            </a:defPPr>
+            <a:lvl1pPr marL="0" algn="l" defTabSz="914400" rtl="0" eaLnBrk="1" latinLnBrk="0" hangingPunct="1">
+              <a:defRPr sz="1800" kern="1200">
+                <a:solidFill>
+                  <a:schemeClr val="tx1"/>
+                </a:solidFill>
+                <a:latin typeface="+mn-lt"/>
+                <a:ea typeface="+mn-ea"/>
+                <a:cs typeface="+mn-cs"/>
+              </a:defRPr>
+            </a:lvl1pPr>
+            <a:lvl2pPr marL="457200" algn="l" defTabSz="914400" rtl="0" eaLnBrk="1" latinLnBrk="0" hangingPunct="1">
+              <a:defRPr sz="1800" kern="1200">
+                <a:solidFill>
+                  <a:schemeClr val="tx1"/>
+                </a:solidFill>
+                <a:latin typeface="+mn-lt"/>
+                <a:ea typeface="+mn-ea"/>
+                <a:cs typeface="+mn-cs"/>
+              </a:defRPr>
+            </a:lvl2pPr>
+            <a:lvl3pPr marL="914400" algn="l" defTabSz="914400" rtl="0" eaLnBrk="1" latinLnBrk="0" hangingPunct="1">
+              <a:defRPr sz="1800" kern="1200">
+                <a:solidFill>
+                  <a:schemeClr val="tx1"/>
+                </a:solidFill>
+                <a:latin typeface="+mn-lt"/>
+                <a:ea typeface="+mn-ea"/>
+                <a:cs typeface="+mn-cs"/>
+              </a:defRPr>
+            </a:lvl3pPr>
+            <a:lvl4pPr marL="1371600" algn="l" defTabSz="914400" rtl="0" eaLnBrk="1" latinLnBrk="0" hangingPunct="1">
+              <a:defRPr sz="1800" kern="1200">
+                <a:solidFill>
+                  <a:schemeClr val="tx1"/>
+                </a:solidFill>
+                <a:latin typeface="+mn-lt"/>
+                <a:ea typeface="+mn-ea"/>
+                <a:cs typeface="+mn-cs"/>
+              </a:defRPr>
+            </a:lvl4pPr>
+            <a:lvl5pPr marL="1828800" algn="l" defTabSz="914400" rtl="0" eaLnBrk="1" latinLnBrk="0" hangingPunct="1">
+              <a:defRPr sz="1800" kern="1200">
+                <a:solidFill>
+                  <a:schemeClr val="tx1"/>
+                </a:solidFill>
+                <a:latin typeface="+mn-lt"/>
+                <a:ea typeface="+mn-ea"/>
+                <a:cs typeface="+mn-cs"/>
+              </a:defRPr>
+            </a:lvl5pPr>
+            <a:lvl6pPr marL="2286000" algn="l" defTabSz="914400" rtl="0" eaLnBrk="1" latinLnBrk="0" hangingPunct="1">
+              <a:defRPr sz="1800" kern="1200">
+                <a:solidFill>
+                  <a:schemeClr val="tx1"/>
+                </a:solidFill>
+                <a:latin typeface="+mn-lt"/>
+                <a:ea typeface="+mn-ea"/>
+                <a:cs typeface="+mn-cs"/>
+              </a:defRPr>
+            </a:lvl6pPr>
+            <a:lvl7pPr marL="2743200" algn="l" defTabSz="914400" rtl="0" eaLnBrk="1" latinLnBrk="0" hangingPunct="1">
+              <a:defRPr sz="1800" kern="1200">
+                <a:solidFill>
+                  <a:schemeClr val="tx1"/>
+                </a:solidFill>
+                <a:latin typeface="+mn-lt"/>
+                <a:ea typeface="+mn-ea"/>
+                <a:cs typeface="+mn-cs"/>
+              </a:defRPr>
+            </a:lvl7pPr>
+            <a:lvl8pPr marL="3200400" algn="l" defTabSz="914400" rtl="0" eaLnBrk="1" latinLnBrk="0" hangingPunct="1">
+              <a:defRPr sz="1800" kern="1200">
+                <a:solidFill>
+                  <a:schemeClr val="tx1"/>
+                </a:solidFill>
+                <a:latin typeface="+mn-lt"/>
+                <a:ea typeface="+mn-ea"/>
+                <a:cs typeface="+mn-cs"/>
+              </a:defRPr>
+            </a:lvl8pPr>
+            <a:lvl9pPr marL="3657600" algn="l" defTabSz="914400" rtl="0" eaLnBrk="1" latinLnBrk="0" hangingPunct="1">
+              <a:defRPr sz="1800" kern="1200">
+                <a:solidFill>
+                  <a:schemeClr val="tx1"/>
+                </a:solidFill>
+                <a:latin typeface="+mn-lt"/>
+                <a:ea typeface="+mn-ea"/>
+                <a:cs typeface="+mn-cs"/>
+              </a:defRPr>
+            </a:lvl9pPr>
+          </a:lstStyle>
           <a:p>
             <a:fld id="{80A02E86-5D94-48B3-A556-A0859BE28805}" type="slidenum">
               <a:rPr lang="de-DE" sz="1400" smtClean="0">
@@ -5184,6 +5578,7 @@
                   </a:schemeClr>
                 </a:solidFill>
               </a:rPr>
+              <a:pPr/>
               <a:t>3</a:t>
             </a:fld>
             <a:endParaRPr lang="de-DE" sz="1400" dirty="0">
@@ -5366,21 +5761,121 @@
       </p:sp>
       <p:sp>
         <p:nvSpPr>
-          <p:cNvPr id="4" name="Foliennummernplatzhalter 3"/>
-          <p:cNvSpPr>
-            <a:spLocks noGrp="1"/>
-          </p:cNvSpPr>
-          <p:nvPr>
-            <p:ph type="sldNum" sz="quarter" idx="12"/>
-          </p:nvPr>
-        </p:nvSpPr>
-        <p:spPr/>
+          <p:cNvPr id="5" name="Foliennummernplatzhalter 3"/>
+          <p:cNvSpPr txBox="1">
+            <a:spLocks/>
+          </p:cNvSpPr>
+          <p:nvPr/>
+        </p:nvSpPr>
+        <p:spPr>
+          <a:xfrm>
+            <a:off x="8460431" y="6480855"/>
+            <a:ext cx="666315" cy="365125"/>
+          </a:xfrm>
+          <a:prstGeom prst="rect">
+            <a:avLst/>
+          </a:prstGeom>
+        </p:spPr>
         <p:txBody>
           <a:bodyPr/>
-          <a:lstStyle/>
+          <a:lstStyle>
+            <a:defPPr>
+              <a:defRPr lang="de-DE"/>
+            </a:defPPr>
+            <a:lvl1pPr marL="0" algn="l" defTabSz="914400" rtl="0" eaLnBrk="1" latinLnBrk="0" hangingPunct="1">
+              <a:defRPr sz="1800" kern="1200">
+                <a:solidFill>
+                  <a:schemeClr val="tx1"/>
+                </a:solidFill>
+                <a:latin typeface="+mn-lt"/>
+                <a:ea typeface="+mn-ea"/>
+                <a:cs typeface="+mn-cs"/>
+              </a:defRPr>
+            </a:lvl1pPr>
+            <a:lvl2pPr marL="457200" algn="l" defTabSz="914400" rtl="0" eaLnBrk="1" latinLnBrk="0" hangingPunct="1">
+              <a:defRPr sz="1800" kern="1200">
+                <a:solidFill>
+                  <a:schemeClr val="tx1"/>
+                </a:solidFill>
+                <a:latin typeface="+mn-lt"/>
+                <a:ea typeface="+mn-ea"/>
+                <a:cs typeface="+mn-cs"/>
+              </a:defRPr>
+            </a:lvl2pPr>
+            <a:lvl3pPr marL="914400" algn="l" defTabSz="914400" rtl="0" eaLnBrk="1" latinLnBrk="0" hangingPunct="1">
+              <a:defRPr sz="1800" kern="1200">
+                <a:solidFill>
+                  <a:schemeClr val="tx1"/>
+                </a:solidFill>
+                <a:latin typeface="+mn-lt"/>
+                <a:ea typeface="+mn-ea"/>
+                <a:cs typeface="+mn-cs"/>
+              </a:defRPr>
+            </a:lvl3pPr>
+            <a:lvl4pPr marL="1371600" algn="l" defTabSz="914400" rtl="0" eaLnBrk="1" latinLnBrk="0" hangingPunct="1">
+              <a:defRPr sz="1800" kern="1200">
+                <a:solidFill>
+                  <a:schemeClr val="tx1"/>
+                </a:solidFill>
+                <a:latin typeface="+mn-lt"/>
+                <a:ea typeface="+mn-ea"/>
+                <a:cs typeface="+mn-cs"/>
+              </a:defRPr>
+            </a:lvl4pPr>
+            <a:lvl5pPr marL="1828800" algn="l" defTabSz="914400" rtl="0" eaLnBrk="1" latinLnBrk="0" hangingPunct="1">
+              <a:defRPr sz="1800" kern="1200">
+                <a:solidFill>
+                  <a:schemeClr val="tx1"/>
+                </a:solidFill>
+                <a:latin typeface="+mn-lt"/>
+                <a:ea typeface="+mn-ea"/>
+                <a:cs typeface="+mn-cs"/>
+              </a:defRPr>
+            </a:lvl5pPr>
+            <a:lvl6pPr marL="2286000" algn="l" defTabSz="914400" rtl="0" eaLnBrk="1" latinLnBrk="0" hangingPunct="1">
+              <a:defRPr sz="1800" kern="1200">
+                <a:solidFill>
+                  <a:schemeClr val="tx1"/>
+                </a:solidFill>
+                <a:latin typeface="+mn-lt"/>
+                <a:ea typeface="+mn-ea"/>
+                <a:cs typeface="+mn-cs"/>
+              </a:defRPr>
+            </a:lvl6pPr>
+            <a:lvl7pPr marL="2743200" algn="l" defTabSz="914400" rtl="0" eaLnBrk="1" latinLnBrk="0" hangingPunct="1">
+              <a:defRPr sz="1800" kern="1200">
+                <a:solidFill>
+                  <a:schemeClr val="tx1"/>
+                </a:solidFill>
+                <a:latin typeface="+mn-lt"/>
+                <a:ea typeface="+mn-ea"/>
+                <a:cs typeface="+mn-cs"/>
+              </a:defRPr>
+            </a:lvl7pPr>
+            <a:lvl8pPr marL="3200400" algn="l" defTabSz="914400" rtl="0" eaLnBrk="1" latinLnBrk="0" hangingPunct="1">
+              <a:defRPr sz="1800" kern="1200">
+                <a:solidFill>
+                  <a:schemeClr val="tx1"/>
+                </a:solidFill>
+                <a:latin typeface="+mn-lt"/>
+                <a:ea typeface="+mn-ea"/>
+                <a:cs typeface="+mn-cs"/>
+              </a:defRPr>
+            </a:lvl8pPr>
+            <a:lvl9pPr marL="3657600" algn="l" defTabSz="914400" rtl="0" eaLnBrk="1" latinLnBrk="0" hangingPunct="1">
+              <a:defRPr sz="1800" kern="1200">
+                <a:solidFill>
+                  <a:schemeClr val="tx1"/>
+                </a:solidFill>
+                <a:latin typeface="+mn-lt"/>
+                <a:ea typeface="+mn-ea"/>
+                <a:cs typeface="+mn-cs"/>
+              </a:defRPr>
+            </a:lvl9pPr>
+          </a:lstStyle>
           <a:p>
             <a:fld id="{80A02E86-5D94-48B3-A556-A0859BE28805}" type="slidenum">
-              <a:rPr lang="de-DE" smtClean="0">
+              <a:rPr lang="de-DE" sz="1400" smtClean="0">
                 <a:solidFill>
                   <a:schemeClr val="tx1">
                     <a:lumMod val="50000"/>
@@ -5388,9 +5883,10 @@
                   </a:schemeClr>
                 </a:solidFill>
               </a:rPr>
+              <a:pPr/>
               <a:t>4</a:t>
             </a:fld>
-            <a:endParaRPr lang="de-DE">
+            <a:endParaRPr lang="de-DE" sz="1400" dirty="0">
               <a:solidFill>
                 <a:schemeClr val="tx1">
                   <a:lumMod val="50000"/>
@@ -5455,46 +5951,9 @@
           <a:p>
             <a:r>
               <a:rPr lang="de-DE" dirty="0" smtClean="0"/>
-              <a:t>Artefakte</a:t>
+              <a:t>Artefakte I</a:t>
             </a:r>
             <a:endParaRPr lang="de-DE" dirty="0"/>
-          </a:p>
-        </p:txBody>
-      </p:sp>
-      <p:sp>
-        <p:nvSpPr>
-          <p:cNvPr id="4" name="Foliennummernplatzhalter 3"/>
-          <p:cNvSpPr>
-            <a:spLocks noGrp="1"/>
-          </p:cNvSpPr>
-          <p:nvPr>
-            <p:ph type="sldNum" sz="quarter" idx="12"/>
-          </p:nvPr>
-        </p:nvSpPr>
-        <p:spPr/>
-        <p:txBody>
-          <a:bodyPr/>
-          <a:lstStyle/>
-          <a:p>
-            <a:fld id="{80A02E86-5D94-48B3-A556-A0859BE28805}" type="slidenum">
-              <a:rPr lang="de-DE" smtClean="0">
-                <a:solidFill>
-                  <a:schemeClr val="tx1">
-                    <a:lumMod val="50000"/>
-                    <a:lumOff val="50000"/>
-                  </a:schemeClr>
-                </a:solidFill>
-              </a:rPr>
-              <a:t>5</a:t>
-            </a:fld>
-            <a:endParaRPr lang="de-DE">
-              <a:solidFill>
-                <a:schemeClr val="tx1">
-                  <a:lumMod val="50000"/>
-                  <a:lumOff val="50000"/>
-                </a:schemeClr>
-              </a:solidFill>
-            </a:endParaRPr>
           </a:p>
         </p:txBody>
       </p:sp>
@@ -5552,6 +6011,144 @@
                 <a:schemeClr val="accent3">
                   <a:lumMod val="60000"/>
                   <a:lumOff val="40000"/>
+                </a:schemeClr>
+              </a:solidFill>
+            </a:endParaRPr>
+          </a:p>
+        </p:txBody>
+      </p:sp>
+      <p:sp>
+        <p:nvSpPr>
+          <p:cNvPr id="6" name="Foliennummernplatzhalter 3"/>
+          <p:cNvSpPr txBox="1">
+            <a:spLocks/>
+          </p:cNvSpPr>
+          <p:nvPr/>
+        </p:nvSpPr>
+        <p:spPr>
+          <a:xfrm>
+            <a:off x="8460431" y="6480855"/>
+            <a:ext cx="666315" cy="365125"/>
+          </a:xfrm>
+          <a:prstGeom prst="rect">
+            <a:avLst/>
+          </a:prstGeom>
+        </p:spPr>
+        <p:txBody>
+          <a:bodyPr/>
+          <a:lstStyle>
+            <a:defPPr>
+              <a:defRPr lang="de-DE"/>
+            </a:defPPr>
+            <a:lvl1pPr marL="0" algn="l" defTabSz="914400" rtl="0" eaLnBrk="1" latinLnBrk="0" hangingPunct="1">
+              <a:defRPr sz="1800" kern="1200">
+                <a:solidFill>
+                  <a:schemeClr val="tx1"/>
+                </a:solidFill>
+                <a:latin typeface="+mn-lt"/>
+                <a:ea typeface="+mn-ea"/>
+                <a:cs typeface="+mn-cs"/>
+              </a:defRPr>
+            </a:lvl1pPr>
+            <a:lvl2pPr marL="457200" algn="l" defTabSz="914400" rtl="0" eaLnBrk="1" latinLnBrk="0" hangingPunct="1">
+              <a:defRPr sz="1800" kern="1200">
+                <a:solidFill>
+                  <a:schemeClr val="tx1"/>
+                </a:solidFill>
+                <a:latin typeface="+mn-lt"/>
+                <a:ea typeface="+mn-ea"/>
+                <a:cs typeface="+mn-cs"/>
+              </a:defRPr>
+            </a:lvl2pPr>
+            <a:lvl3pPr marL="914400" algn="l" defTabSz="914400" rtl="0" eaLnBrk="1" latinLnBrk="0" hangingPunct="1">
+              <a:defRPr sz="1800" kern="1200">
+                <a:solidFill>
+                  <a:schemeClr val="tx1"/>
+                </a:solidFill>
+                <a:latin typeface="+mn-lt"/>
+                <a:ea typeface="+mn-ea"/>
+                <a:cs typeface="+mn-cs"/>
+              </a:defRPr>
+            </a:lvl3pPr>
+            <a:lvl4pPr marL="1371600" algn="l" defTabSz="914400" rtl="0" eaLnBrk="1" latinLnBrk="0" hangingPunct="1">
+              <a:defRPr sz="1800" kern="1200">
+                <a:solidFill>
+                  <a:schemeClr val="tx1"/>
+                </a:solidFill>
+                <a:latin typeface="+mn-lt"/>
+                <a:ea typeface="+mn-ea"/>
+                <a:cs typeface="+mn-cs"/>
+              </a:defRPr>
+            </a:lvl4pPr>
+            <a:lvl5pPr marL="1828800" algn="l" defTabSz="914400" rtl="0" eaLnBrk="1" latinLnBrk="0" hangingPunct="1">
+              <a:defRPr sz="1800" kern="1200">
+                <a:solidFill>
+                  <a:schemeClr val="tx1"/>
+                </a:solidFill>
+                <a:latin typeface="+mn-lt"/>
+                <a:ea typeface="+mn-ea"/>
+                <a:cs typeface="+mn-cs"/>
+              </a:defRPr>
+            </a:lvl5pPr>
+            <a:lvl6pPr marL="2286000" algn="l" defTabSz="914400" rtl="0" eaLnBrk="1" latinLnBrk="0" hangingPunct="1">
+              <a:defRPr sz="1800" kern="1200">
+                <a:solidFill>
+                  <a:schemeClr val="tx1"/>
+                </a:solidFill>
+                <a:latin typeface="+mn-lt"/>
+                <a:ea typeface="+mn-ea"/>
+                <a:cs typeface="+mn-cs"/>
+              </a:defRPr>
+            </a:lvl6pPr>
+            <a:lvl7pPr marL="2743200" algn="l" defTabSz="914400" rtl="0" eaLnBrk="1" latinLnBrk="0" hangingPunct="1">
+              <a:defRPr sz="1800" kern="1200">
+                <a:solidFill>
+                  <a:schemeClr val="tx1"/>
+                </a:solidFill>
+                <a:latin typeface="+mn-lt"/>
+                <a:ea typeface="+mn-ea"/>
+                <a:cs typeface="+mn-cs"/>
+              </a:defRPr>
+            </a:lvl7pPr>
+            <a:lvl8pPr marL="3200400" algn="l" defTabSz="914400" rtl="0" eaLnBrk="1" latinLnBrk="0" hangingPunct="1">
+              <a:defRPr sz="1800" kern="1200">
+                <a:solidFill>
+                  <a:schemeClr val="tx1"/>
+                </a:solidFill>
+                <a:latin typeface="+mn-lt"/>
+                <a:ea typeface="+mn-ea"/>
+                <a:cs typeface="+mn-cs"/>
+              </a:defRPr>
+            </a:lvl8pPr>
+            <a:lvl9pPr marL="3657600" algn="l" defTabSz="914400" rtl="0" eaLnBrk="1" latinLnBrk="0" hangingPunct="1">
+              <a:defRPr sz="1800" kern="1200">
+                <a:solidFill>
+                  <a:schemeClr val="tx1"/>
+                </a:solidFill>
+                <a:latin typeface="+mn-lt"/>
+                <a:ea typeface="+mn-ea"/>
+                <a:cs typeface="+mn-cs"/>
+              </a:defRPr>
+            </a:lvl9pPr>
+          </a:lstStyle>
+          <a:p>
+            <a:fld id="{80A02E86-5D94-48B3-A556-A0859BE28805}" type="slidenum">
+              <a:rPr lang="de-DE" sz="1400" smtClean="0">
+                <a:solidFill>
+                  <a:schemeClr val="tx1">
+                    <a:lumMod val="50000"/>
+                    <a:lumOff val="50000"/>
+                  </a:schemeClr>
+                </a:solidFill>
+              </a:rPr>
+              <a:pPr/>
+              <a:t>5</a:t>
+            </a:fld>
+            <a:endParaRPr lang="de-DE" sz="1400" dirty="0">
+              <a:solidFill>
+                <a:schemeClr val="tx1">
+                  <a:lumMod val="50000"/>
+                  <a:lumOff val="50000"/>
                 </a:schemeClr>
               </a:solidFill>
             </a:endParaRPr>
@@ -5612,46 +6209,9 @@
           <a:p>
             <a:r>
               <a:rPr lang="de-DE" dirty="0" smtClean="0"/>
-              <a:t>Artefakte</a:t>
+              <a:t>Artefakte II</a:t>
             </a:r>
             <a:endParaRPr lang="de-DE" dirty="0"/>
-          </a:p>
-        </p:txBody>
-      </p:sp>
-      <p:sp>
-        <p:nvSpPr>
-          <p:cNvPr id="4" name="Foliennummernplatzhalter 3"/>
-          <p:cNvSpPr>
-            <a:spLocks noGrp="1"/>
-          </p:cNvSpPr>
-          <p:nvPr>
-            <p:ph type="sldNum" sz="quarter" idx="12"/>
-          </p:nvPr>
-        </p:nvSpPr>
-        <p:spPr/>
-        <p:txBody>
-          <a:bodyPr/>
-          <a:lstStyle/>
-          <a:p>
-            <a:fld id="{80A02E86-5D94-48B3-A556-A0859BE28805}" type="slidenum">
-              <a:rPr lang="de-DE" smtClean="0">
-                <a:solidFill>
-                  <a:schemeClr val="tx1">
-                    <a:lumMod val="50000"/>
-                    <a:lumOff val="50000"/>
-                  </a:schemeClr>
-                </a:solidFill>
-              </a:rPr>
-              <a:t>6</a:t>
-            </a:fld>
-            <a:endParaRPr lang="de-DE">
-              <a:solidFill>
-                <a:schemeClr val="tx1">
-                  <a:lumMod val="50000"/>
-                  <a:lumOff val="50000"/>
-                </a:schemeClr>
-              </a:solidFill>
-            </a:endParaRPr>
           </a:p>
         </p:txBody>
       </p:sp>
@@ -5709,6 +6269,144 @@
                 <a:schemeClr val="accent3">
                   <a:lumMod val="60000"/>
                   <a:lumOff val="40000"/>
+                </a:schemeClr>
+              </a:solidFill>
+            </a:endParaRPr>
+          </a:p>
+        </p:txBody>
+      </p:sp>
+      <p:sp>
+        <p:nvSpPr>
+          <p:cNvPr id="6" name="Foliennummernplatzhalter 3"/>
+          <p:cNvSpPr txBox="1">
+            <a:spLocks/>
+          </p:cNvSpPr>
+          <p:nvPr/>
+        </p:nvSpPr>
+        <p:spPr>
+          <a:xfrm>
+            <a:off x="8460431" y="6480855"/>
+            <a:ext cx="666315" cy="365125"/>
+          </a:xfrm>
+          <a:prstGeom prst="rect">
+            <a:avLst/>
+          </a:prstGeom>
+        </p:spPr>
+        <p:txBody>
+          <a:bodyPr/>
+          <a:lstStyle>
+            <a:defPPr>
+              <a:defRPr lang="de-DE"/>
+            </a:defPPr>
+            <a:lvl1pPr marL="0" algn="l" defTabSz="914400" rtl="0" eaLnBrk="1" latinLnBrk="0" hangingPunct="1">
+              <a:defRPr sz="1800" kern="1200">
+                <a:solidFill>
+                  <a:schemeClr val="tx1"/>
+                </a:solidFill>
+                <a:latin typeface="+mn-lt"/>
+                <a:ea typeface="+mn-ea"/>
+                <a:cs typeface="+mn-cs"/>
+              </a:defRPr>
+            </a:lvl1pPr>
+            <a:lvl2pPr marL="457200" algn="l" defTabSz="914400" rtl="0" eaLnBrk="1" latinLnBrk="0" hangingPunct="1">
+              <a:defRPr sz="1800" kern="1200">
+                <a:solidFill>
+                  <a:schemeClr val="tx1"/>
+                </a:solidFill>
+                <a:latin typeface="+mn-lt"/>
+                <a:ea typeface="+mn-ea"/>
+                <a:cs typeface="+mn-cs"/>
+              </a:defRPr>
+            </a:lvl2pPr>
+            <a:lvl3pPr marL="914400" algn="l" defTabSz="914400" rtl="0" eaLnBrk="1" latinLnBrk="0" hangingPunct="1">
+              <a:defRPr sz="1800" kern="1200">
+                <a:solidFill>
+                  <a:schemeClr val="tx1"/>
+                </a:solidFill>
+                <a:latin typeface="+mn-lt"/>
+                <a:ea typeface="+mn-ea"/>
+                <a:cs typeface="+mn-cs"/>
+              </a:defRPr>
+            </a:lvl3pPr>
+            <a:lvl4pPr marL="1371600" algn="l" defTabSz="914400" rtl="0" eaLnBrk="1" latinLnBrk="0" hangingPunct="1">
+              <a:defRPr sz="1800" kern="1200">
+                <a:solidFill>
+                  <a:schemeClr val="tx1"/>
+                </a:solidFill>
+                <a:latin typeface="+mn-lt"/>
+                <a:ea typeface="+mn-ea"/>
+                <a:cs typeface="+mn-cs"/>
+              </a:defRPr>
+            </a:lvl4pPr>
+            <a:lvl5pPr marL="1828800" algn="l" defTabSz="914400" rtl="0" eaLnBrk="1" latinLnBrk="0" hangingPunct="1">
+              <a:defRPr sz="1800" kern="1200">
+                <a:solidFill>
+                  <a:schemeClr val="tx1"/>
+                </a:solidFill>
+                <a:latin typeface="+mn-lt"/>
+                <a:ea typeface="+mn-ea"/>
+                <a:cs typeface="+mn-cs"/>
+              </a:defRPr>
+            </a:lvl5pPr>
+            <a:lvl6pPr marL="2286000" algn="l" defTabSz="914400" rtl="0" eaLnBrk="1" latinLnBrk="0" hangingPunct="1">
+              <a:defRPr sz="1800" kern="1200">
+                <a:solidFill>
+                  <a:schemeClr val="tx1"/>
+                </a:solidFill>
+                <a:latin typeface="+mn-lt"/>
+                <a:ea typeface="+mn-ea"/>
+                <a:cs typeface="+mn-cs"/>
+              </a:defRPr>
+            </a:lvl6pPr>
+            <a:lvl7pPr marL="2743200" algn="l" defTabSz="914400" rtl="0" eaLnBrk="1" latinLnBrk="0" hangingPunct="1">
+              <a:defRPr sz="1800" kern="1200">
+                <a:solidFill>
+                  <a:schemeClr val="tx1"/>
+                </a:solidFill>
+                <a:latin typeface="+mn-lt"/>
+                <a:ea typeface="+mn-ea"/>
+                <a:cs typeface="+mn-cs"/>
+              </a:defRPr>
+            </a:lvl7pPr>
+            <a:lvl8pPr marL="3200400" algn="l" defTabSz="914400" rtl="0" eaLnBrk="1" latinLnBrk="0" hangingPunct="1">
+              <a:defRPr sz="1800" kern="1200">
+                <a:solidFill>
+                  <a:schemeClr val="tx1"/>
+                </a:solidFill>
+                <a:latin typeface="+mn-lt"/>
+                <a:ea typeface="+mn-ea"/>
+                <a:cs typeface="+mn-cs"/>
+              </a:defRPr>
+            </a:lvl8pPr>
+            <a:lvl9pPr marL="3657600" algn="l" defTabSz="914400" rtl="0" eaLnBrk="1" latinLnBrk="0" hangingPunct="1">
+              <a:defRPr sz="1800" kern="1200">
+                <a:solidFill>
+                  <a:schemeClr val="tx1"/>
+                </a:solidFill>
+                <a:latin typeface="+mn-lt"/>
+                <a:ea typeface="+mn-ea"/>
+                <a:cs typeface="+mn-cs"/>
+              </a:defRPr>
+            </a:lvl9pPr>
+          </a:lstStyle>
+          <a:p>
+            <a:fld id="{80A02E86-5D94-48B3-A556-A0859BE28805}" type="slidenum">
+              <a:rPr lang="de-DE" sz="1400" smtClean="0">
+                <a:solidFill>
+                  <a:schemeClr val="tx1">
+                    <a:lumMod val="50000"/>
+                    <a:lumOff val="50000"/>
+                  </a:schemeClr>
+                </a:solidFill>
+              </a:rPr>
+              <a:pPr/>
+              <a:t>6</a:t>
+            </a:fld>
+            <a:endParaRPr lang="de-DE" sz="1400" dirty="0">
+              <a:solidFill>
+                <a:schemeClr val="tx1">
+                  <a:lumMod val="50000"/>
+                  <a:lumOff val="50000"/>
                 </a:schemeClr>
               </a:solidFill>
             </a:endParaRPr>
@@ -5769,46 +6467,9 @@
           <a:p>
             <a:r>
               <a:rPr lang="de-DE" dirty="0" smtClean="0"/>
-              <a:t>Artefakte</a:t>
+              <a:t>Artefakte III</a:t>
             </a:r>
             <a:endParaRPr lang="de-DE" dirty="0"/>
-          </a:p>
-        </p:txBody>
-      </p:sp>
-      <p:sp>
-        <p:nvSpPr>
-          <p:cNvPr id="4" name="Foliennummernplatzhalter 3"/>
-          <p:cNvSpPr>
-            <a:spLocks noGrp="1"/>
-          </p:cNvSpPr>
-          <p:nvPr>
-            <p:ph type="sldNum" sz="quarter" idx="12"/>
-          </p:nvPr>
-        </p:nvSpPr>
-        <p:spPr/>
-        <p:txBody>
-          <a:bodyPr/>
-          <a:lstStyle/>
-          <a:p>
-            <a:fld id="{80A02E86-5D94-48B3-A556-A0859BE28805}" type="slidenum">
-              <a:rPr lang="de-DE" smtClean="0">
-                <a:solidFill>
-                  <a:schemeClr val="tx1">
-                    <a:lumMod val="50000"/>
-                    <a:lumOff val="50000"/>
-                  </a:schemeClr>
-                </a:solidFill>
-              </a:rPr>
-              <a:t>7</a:t>
-            </a:fld>
-            <a:endParaRPr lang="de-DE">
-              <a:solidFill>
-                <a:schemeClr val="tx1">
-                  <a:lumMod val="50000"/>
-                  <a:lumOff val="50000"/>
-                </a:schemeClr>
-              </a:solidFill>
-            </a:endParaRPr>
           </a:p>
         </p:txBody>
       </p:sp>
@@ -5866,6 +6527,144 @@
                 <a:schemeClr val="accent3">
                   <a:lumMod val="60000"/>
                   <a:lumOff val="40000"/>
+                </a:schemeClr>
+              </a:solidFill>
+            </a:endParaRPr>
+          </a:p>
+        </p:txBody>
+      </p:sp>
+      <p:sp>
+        <p:nvSpPr>
+          <p:cNvPr id="6" name="Foliennummernplatzhalter 3"/>
+          <p:cNvSpPr txBox="1">
+            <a:spLocks/>
+          </p:cNvSpPr>
+          <p:nvPr/>
+        </p:nvSpPr>
+        <p:spPr>
+          <a:xfrm>
+            <a:off x="8460431" y="6480855"/>
+            <a:ext cx="666315" cy="365125"/>
+          </a:xfrm>
+          <a:prstGeom prst="rect">
+            <a:avLst/>
+          </a:prstGeom>
+        </p:spPr>
+        <p:txBody>
+          <a:bodyPr/>
+          <a:lstStyle>
+            <a:defPPr>
+              <a:defRPr lang="de-DE"/>
+            </a:defPPr>
+            <a:lvl1pPr marL="0" algn="l" defTabSz="914400" rtl="0" eaLnBrk="1" latinLnBrk="0" hangingPunct="1">
+              <a:defRPr sz="1800" kern="1200">
+                <a:solidFill>
+                  <a:schemeClr val="tx1"/>
+                </a:solidFill>
+                <a:latin typeface="+mn-lt"/>
+                <a:ea typeface="+mn-ea"/>
+                <a:cs typeface="+mn-cs"/>
+              </a:defRPr>
+            </a:lvl1pPr>
+            <a:lvl2pPr marL="457200" algn="l" defTabSz="914400" rtl="0" eaLnBrk="1" latinLnBrk="0" hangingPunct="1">
+              <a:defRPr sz="1800" kern="1200">
+                <a:solidFill>
+                  <a:schemeClr val="tx1"/>
+                </a:solidFill>
+                <a:latin typeface="+mn-lt"/>
+                <a:ea typeface="+mn-ea"/>
+                <a:cs typeface="+mn-cs"/>
+              </a:defRPr>
+            </a:lvl2pPr>
+            <a:lvl3pPr marL="914400" algn="l" defTabSz="914400" rtl="0" eaLnBrk="1" latinLnBrk="0" hangingPunct="1">
+              <a:defRPr sz="1800" kern="1200">
+                <a:solidFill>
+                  <a:schemeClr val="tx1"/>
+                </a:solidFill>
+                <a:latin typeface="+mn-lt"/>
+                <a:ea typeface="+mn-ea"/>
+                <a:cs typeface="+mn-cs"/>
+              </a:defRPr>
+            </a:lvl3pPr>
+            <a:lvl4pPr marL="1371600" algn="l" defTabSz="914400" rtl="0" eaLnBrk="1" latinLnBrk="0" hangingPunct="1">
+              <a:defRPr sz="1800" kern="1200">
+                <a:solidFill>
+                  <a:schemeClr val="tx1"/>
+                </a:solidFill>
+                <a:latin typeface="+mn-lt"/>
+                <a:ea typeface="+mn-ea"/>
+                <a:cs typeface="+mn-cs"/>
+              </a:defRPr>
+            </a:lvl4pPr>
+            <a:lvl5pPr marL="1828800" algn="l" defTabSz="914400" rtl="0" eaLnBrk="1" latinLnBrk="0" hangingPunct="1">
+              <a:defRPr sz="1800" kern="1200">
+                <a:solidFill>
+                  <a:schemeClr val="tx1"/>
+                </a:solidFill>
+                <a:latin typeface="+mn-lt"/>
+                <a:ea typeface="+mn-ea"/>
+                <a:cs typeface="+mn-cs"/>
+              </a:defRPr>
+            </a:lvl5pPr>
+            <a:lvl6pPr marL="2286000" algn="l" defTabSz="914400" rtl="0" eaLnBrk="1" latinLnBrk="0" hangingPunct="1">
+              <a:defRPr sz="1800" kern="1200">
+                <a:solidFill>
+                  <a:schemeClr val="tx1"/>
+                </a:solidFill>
+                <a:latin typeface="+mn-lt"/>
+                <a:ea typeface="+mn-ea"/>
+                <a:cs typeface="+mn-cs"/>
+              </a:defRPr>
+            </a:lvl6pPr>
+            <a:lvl7pPr marL="2743200" algn="l" defTabSz="914400" rtl="0" eaLnBrk="1" latinLnBrk="0" hangingPunct="1">
+              <a:defRPr sz="1800" kern="1200">
+                <a:solidFill>
+                  <a:schemeClr val="tx1"/>
+                </a:solidFill>
+                <a:latin typeface="+mn-lt"/>
+                <a:ea typeface="+mn-ea"/>
+                <a:cs typeface="+mn-cs"/>
+              </a:defRPr>
+            </a:lvl7pPr>
+            <a:lvl8pPr marL="3200400" algn="l" defTabSz="914400" rtl="0" eaLnBrk="1" latinLnBrk="0" hangingPunct="1">
+              <a:defRPr sz="1800" kern="1200">
+                <a:solidFill>
+                  <a:schemeClr val="tx1"/>
+                </a:solidFill>
+                <a:latin typeface="+mn-lt"/>
+                <a:ea typeface="+mn-ea"/>
+                <a:cs typeface="+mn-cs"/>
+              </a:defRPr>
+            </a:lvl8pPr>
+            <a:lvl9pPr marL="3657600" algn="l" defTabSz="914400" rtl="0" eaLnBrk="1" latinLnBrk="0" hangingPunct="1">
+              <a:defRPr sz="1800" kern="1200">
+                <a:solidFill>
+                  <a:schemeClr val="tx1"/>
+                </a:solidFill>
+                <a:latin typeface="+mn-lt"/>
+                <a:ea typeface="+mn-ea"/>
+                <a:cs typeface="+mn-cs"/>
+              </a:defRPr>
+            </a:lvl9pPr>
+          </a:lstStyle>
+          <a:p>
+            <a:fld id="{80A02E86-5D94-48B3-A556-A0859BE28805}" type="slidenum">
+              <a:rPr lang="de-DE" sz="1400" smtClean="0">
+                <a:solidFill>
+                  <a:schemeClr val="tx1">
+                    <a:lumMod val="50000"/>
+                    <a:lumOff val="50000"/>
+                  </a:schemeClr>
+                </a:solidFill>
+              </a:rPr>
+              <a:pPr/>
+              <a:t>7</a:t>
+            </a:fld>
+            <a:endParaRPr lang="de-DE" sz="1400" dirty="0">
+              <a:solidFill>
+                <a:schemeClr val="tx1">
+                  <a:lumMod val="50000"/>
+                  <a:lumOff val="50000"/>
                 </a:schemeClr>
               </a:solidFill>
             </a:endParaRPr>
@@ -5982,21 +6781,121 @@
       </p:sp>
       <p:sp>
         <p:nvSpPr>
-          <p:cNvPr id="4" name="Foliennummernplatzhalter 3"/>
-          <p:cNvSpPr>
-            <a:spLocks noGrp="1"/>
-          </p:cNvSpPr>
-          <p:nvPr>
-            <p:ph type="sldNum" sz="quarter" idx="12"/>
-          </p:nvPr>
-        </p:nvSpPr>
-        <p:spPr/>
+          <p:cNvPr id="5" name="Foliennummernplatzhalter 3"/>
+          <p:cNvSpPr txBox="1">
+            <a:spLocks/>
+          </p:cNvSpPr>
+          <p:nvPr/>
+        </p:nvSpPr>
+        <p:spPr>
+          <a:xfrm>
+            <a:off x="8460431" y="6480855"/>
+            <a:ext cx="666315" cy="365125"/>
+          </a:xfrm>
+          <a:prstGeom prst="rect">
+            <a:avLst/>
+          </a:prstGeom>
+        </p:spPr>
         <p:txBody>
           <a:bodyPr/>
-          <a:lstStyle/>
+          <a:lstStyle>
+            <a:defPPr>
+              <a:defRPr lang="de-DE"/>
+            </a:defPPr>
+            <a:lvl1pPr marL="0" algn="l" defTabSz="914400" rtl="0" eaLnBrk="1" latinLnBrk="0" hangingPunct="1">
+              <a:defRPr sz="1800" kern="1200">
+                <a:solidFill>
+                  <a:schemeClr val="tx1"/>
+                </a:solidFill>
+                <a:latin typeface="+mn-lt"/>
+                <a:ea typeface="+mn-ea"/>
+                <a:cs typeface="+mn-cs"/>
+              </a:defRPr>
+            </a:lvl1pPr>
+            <a:lvl2pPr marL="457200" algn="l" defTabSz="914400" rtl="0" eaLnBrk="1" latinLnBrk="0" hangingPunct="1">
+              <a:defRPr sz="1800" kern="1200">
+                <a:solidFill>
+                  <a:schemeClr val="tx1"/>
+                </a:solidFill>
+                <a:latin typeface="+mn-lt"/>
+                <a:ea typeface="+mn-ea"/>
+                <a:cs typeface="+mn-cs"/>
+              </a:defRPr>
+            </a:lvl2pPr>
+            <a:lvl3pPr marL="914400" algn="l" defTabSz="914400" rtl="0" eaLnBrk="1" latinLnBrk="0" hangingPunct="1">
+              <a:defRPr sz="1800" kern="1200">
+                <a:solidFill>
+                  <a:schemeClr val="tx1"/>
+                </a:solidFill>
+                <a:latin typeface="+mn-lt"/>
+                <a:ea typeface="+mn-ea"/>
+                <a:cs typeface="+mn-cs"/>
+              </a:defRPr>
+            </a:lvl3pPr>
+            <a:lvl4pPr marL="1371600" algn="l" defTabSz="914400" rtl="0" eaLnBrk="1" latinLnBrk="0" hangingPunct="1">
+              <a:defRPr sz="1800" kern="1200">
+                <a:solidFill>
+                  <a:schemeClr val="tx1"/>
+                </a:solidFill>
+                <a:latin typeface="+mn-lt"/>
+                <a:ea typeface="+mn-ea"/>
+                <a:cs typeface="+mn-cs"/>
+              </a:defRPr>
+            </a:lvl4pPr>
+            <a:lvl5pPr marL="1828800" algn="l" defTabSz="914400" rtl="0" eaLnBrk="1" latinLnBrk="0" hangingPunct="1">
+              <a:defRPr sz="1800" kern="1200">
+                <a:solidFill>
+                  <a:schemeClr val="tx1"/>
+                </a:solidFill>
+                <a:latin typeface="+mn-lt"/>
+                <a:ea typeface="+mn-ea"/>
+                <a:cs typeface="+mn-cs"/>
+              </a:defRPr>
+            </a:lvl5pPr>
+            <a:lvl6pPr marL="2286000" algn="l" defTabSz="914400" rtl="0" eaLnBrk="1" latinLnBrk="0" hangingPunct="1">
+              <a:defRPr sz="1800" kern="1200">
+                <a:solidFill>
+                  <a:schemeClr val="tx1"/>
+                </a:solidFill>
+                <a:latin typeface="+mn-lt"/>
+                <a:ea typeface="+mn-ea"/>
+                <a:cs typeface="+mn-cs"/>
+              </a:defRPr>
+            </a:lvl6pPr>
+            <a:lvl7pPr marL="2743200" algn="l" defTabSz="914400" rtl="0" eaLnBrk="1" latinLnBrk="0" hangingPunct="1">
+              <a:defRPr sz="1800" kern="1200">
+                <a:solidFill>
+                  <a:schemeClr val="tx1"/>
+                </a:solidFill>
+                <a:latin typeface="+mn-lt"/>
+                <a:ea typeface="+mn-ea"/>
+                <a:cs typeface="+mn-cs"/>
+              </a:defRPr>
+            </a:lvl7pPr>
+            <a:lvl8pPr marL="3200400" algn="l" defTabSz="914400" rtl="0" eaLnBrk="1" latinLnBrk="0" hangingPunct="1">
+              <a:defRPr sz="1800" kern="1200">
+                <a:solidFill>
+                  <a:schemeClr val="tx1"/>
+                </a:solidFill>
+                <a:latin typeface="+mn-lt"/>
+                <a:ea typeface="+mn-ea"/>
+                <a:cs typeface="+mn-cs"/>
+              </a:defRPr>
+            </a:lvl8pPr>
+            <a:lvl9pPr marL="3657600" algn="l" defTabSz="914400" rtl="0" eaLnBrk="1" latinLnBrk="0" hangingPunct="1">
+              <a:defRPr sz="1800" kern="1200">
+                <a:solidFill>
+                  <a:schemeClr val="tx1"/>
+                </a:solidFill>
+                <a:latin typeface="+mn-lt"/>
+                <a:ea typeface="+mn-ea"/>
+                <a:cs typeface="+mn-cs"/>
+              </a:defRPr>
+            </a:lvl9pPr>
+          </a:lstStyle>
           <a:p>
             <a:fld id="{80A02E86-5D94-48B3-A556-A0859BE28805}" type="slidenum">
-              <a:rPr lang="de-DE" smtClean="0">
+              <a:rPr lang="de-DE" sz="1400" smtClean="0">
                 <a:solidFill>
                   <a:schemeClr val="tx1">
                     <a:lumMod val="50000"/>
@@ -6004,9 +6903,10 @@
                   </a:schemeClr>
                 </a:solidFill>
               </a:rPr>
+              <a:pPr/>
               <a:t>8</a:t>
             </a:fld>
-            <a:endParaRPr lang="de-DE">
+            <a:endParaRPr lang="de-DE" sz="1400" dirty="0">
               <a:solidFill>
                 <a:schemeClr val="tx1">
                   <a:lumMod val="50000"/>
@@ -6179,23 +7079,317 @@
       </p:sp>
       <p:sp>
         <p:nvSpPr>
-          <p:cNvPr id="4" name="Foliennummernplatzhalter 3"/>
-          <p:cNvSpPr>
-            <a:spLocks noGrp="1"/>
-          </p:cNvSpPr>
-          <p:nvPr>
-            <p:ph type="sldNum" sz="quarter" idx="12"/>
-          </p:nvPr>
-        </p:nvSpPr>
-        <p:spPr>
-          <a:xfrm>
-            <a:off x="8532440" y="6492875"/>
-            <a:ext cx="611560" cy="365125"/>
-          </a:xfrm>
+          <p:cNvPr id="5" name="Inhaltsplatzhalter 2"/>
+          <p:cNvSpPr txBox="1">
+            <a:spLocks/>
+          </p:cNvSpPr>
+          <p:nvPr/>
+        </p:nvSpPr>
+        <p:spPr>
+          <a:xfrm>
+            <a:off x="4572000" y="1556792"/>
+            <a:ext cx="4320480" cy="4597971"/>
+          </a:xfrm>
+          <a:prstGeom prst="rect">
+            <a:avLst/>
+          </a:prstGeom>
         </p:spPr>
         <p:txBody>
           <a:bodyPr/>
-          <a:lstStyle/>
+          <a:lstStyle>
+            <a:lvl1pPr marL="342900" indent="-342900" algn="l" defTabSz="914400" rtl="0" eaLnBrk="1" latinLnBrk="0" hangingPunct="1">
+              <a:spcBef>
+                <a:spcPct val="20000"/>
+              </a:spcBef>
+              <a:buFont typeface="Arial" panose="020B0604020202020204" pitchFamily="34" charset="0"/>
+              <a:buChar char="•"/>
+              <a:defRPr sz="3200" kern="1200">
+                <a:solidFill>
+                  <a:schemeClr val="tx1"/>
+                </a:solidFill>
+                <a:latin typeface="+mn-lt"/>
+                <a:ea typeface="+mn-ea"/>
+                <a:cs typeface="+mn-cs"/>
+              </a:defRPr>
+            </a:lvl1pPr>
+            <a:lvl2pPr marL="742950" indent="-285750" algn="l" defTabSz="914400" rtl="0" eaLnBrk="1" latinLnBrk="0" hangingPunct="1">
+              <a:spcBef>
+                <a:spcPct val="20000"/>
+              </a:spcBef>
+              <a:buFont typeface="Arial" panose="020B0604020202020204" pitchFamily="34" charset="0"/>
+              <a:buChar char="–"/>
+              <a:defRPr sz="2800" kern="1200">
+                <a:solidFill>
+                  <a:schemeClr val="tx1"/>
+                </a:solidFill>
+                <a:latin typeface="+mn-lt"/>
+                <a:ea typeface="+mn-ea"/>
+                <a:cs typeface="+mn-cs"/>
+              </a:defRPr>
+            </a:lvl2pPr>
+            <a:lvl3pPr marL="1143000" indent="-228600" algn="l" defTabSz="914400" rtl="0" eaLnBrk="1" latinLnBrk="0" hangingPunct="1">
+              <a:spcBef>
+                <a:spcPct val="20000"/>
+              </a:spcBef>
+              <a:buFont typeface="Arial" panose="020B0604020202020204" pitchFamily="34" charset="0"/>
+              <a:buChar char="•"/>
+              <a:defRPr sz="2400" kern="1200">
+                <a:solidFill>
+                  <a:schemeClr val="tx1"/>
+                </a:solidFill>
+                <a:latin typeface="+mn-lt"/>
+                <a:ea typeface="+mn-ea"/>
+                <a:cs typeface="+mn-cs"/>
+              </a:defRPr>
+            </a:lvl3pPr>
+            <a:lvl4pPr marL="1600200" indent="-228600" algn="l" defTabSz="914400" rtl="0" eaLnBrk="1" latinLnBrk="0" hangingPunct="1">
+              <a:spcBef>
+                <a:spcPct val="20000"/>
+              </a:spcBef>
+              <a:buFont typeface="Arial" panose="020B0604020202020204" pitchFamily="34" charset="0"/>
+              <a:buChar char="–"/>
+              <a:defRPr sz="2000" kern="1200">
+                <a:solidFill>
+                  <a:schemeClr val="tx1"/>
+                </a:solidFill>
+                <a:latin typeface="+mn-lt"/>
+                <a:ea typeface="+mn-ea"/>
+                <a:cs typeface="+mn-cs"/>
+              </a:defRPr>
+            </a:lvl4pPr>
+            <a:lvl5pPr marL="2057400" indent="-228600" algn="l" defTabSz="914400" rtl="0" eaLnBrk="1" latinLnBrk="0" hangingPunct="1">
+              <a:spcBef>
+                <a:spcPct val="20000"/>
+              </a:spcBef>
+              <a:buFont typeface="Arial" panose="020B0604020202020204" pitchFamily="34" charset="0"/>
+              <a:buChar char="»"/>
+              <a:defRPr sz="2000" kern="1200">
+                <a:solidFill>
+                  <a:schemeClr val="tx1"/>
+                </a:solidFill>
+                <a:latin typeface="+mn-lt"/>
+                <a:ea typeface="+mn-ea"/>
+                <a:cs typeface="+mn-cs"/>
+              </a:defRPr>
+            </a:lvl5pPr>
+            <a:lvl6pPr marL="2514600" indent="-228600" algn="l" defTabSz="914400" rtl="0" eaLnBrk="1" latinLnBrk="0" hangingPunct="1">
+              <a:spcBef>
+                <a:spcPct val="20000"/>
+              </a:spcBef>
+              <a:buFont typeface="Arial" panose="020B0604020202020204" pitchFamily="34" charset="0"/>
+              <a:buChar char="•"/>
+              <a:defRPr sz="2000" kern="1200">
+                <a:solidFill>
+                  <a:schemeClr val="tx1"/>
+                </a:solidFill>
+                <a:latin typeface="+mn-lt"/>
+                <a:ea typeface="+mn-ea"/>
+                <a:cs typeface="+mn-cs"/>
+              </a:defRPr>
+            </a:lvl6pPr>
+            <a:lvl7pPr marL="2971800" indent="-228600" algn="l" defTabSz="914400" rtl="0" eaLnBrk="1" latinLnBrk="0" hangingPunct="1">
+              <a:spcBef>
+                <a:spcPct val="20000"/>
+              </a:spcBef>
+              <a:buFont typeface="Arial" panose="020B0604020202020204" pitchFamily="34" charset="0"/>
+              <a:buChar char="•"/>
+              <a:defRPr sz="2000" kern="1200">
+                <a:solidFill>
+                  <a:schemeClr val="tx1"/>
+                </a:solidFill>
+                <a:latin typeface="+mn-lt"/>
+                <a:ea typeface="+mn-ea"/>
+                <a:cs typeface="+mn-cs"/>
+              </a:defRPr>
+            </a:lvl7pPr>
+            <a:lvl8pPr marL="3429000" indent="-228600" algn="l" defTabSz="914400" rtl="0" eaLnBrk="1" latinLnBrk="0" hangingPunct="1">
+              <a:spcBef>
+                <a:spcPct val="20000"/>
+              </a:spcBef>
+              <a:buFont typeface="Arial" panose="020B0604020202020204" pitchFamily="34" charset="0"/>
+              <a:buChar char="•"/>
+              <a:defRPr sz="2000" kern="1200">
+                <a:solidFill>
+                  <a:schemeClr val="tx1"/>
+                </a:solidFill>
+                <a:latin typeface="+mn-lt"/>
+                <a:ea typeface="+mn-ea"/>
+                <a:cs typeface="+mn-cs"/>
+              </a:defRPr>
+            </a:lvl8pPr>
+            <a:lvl9pPr marL="3886200" indent="-228600" algn="l" defTabSz="914400" rtl="0" eaLnBrk="1" latinLnBrk="0" hangingPunct="1">
+              <a:spcBef>
+                <a:spcPct val="20000"/>
+              </a:spcBef>
+              <a:buFont typeface="Arial" panose="020B0604020202020204" pitchFamily="34" charset="0"/>
+              <a:buChar char="•"/>
+              <a:defRPr sz="2000" kern="1200">
+                <a:solidFill>
+                  <a:schemeClr val="tx1"/>
+                </a:solidFill>
+                <a:latin typeface="+mn-lt"/>
+                <a:ea typeface="+mn-ea"/>
+                <a:cs typeface="+mn-cs"/>
+              </a:defRPr>
+            </a:lvl9pPr>
+          </a:lstStyle>
+          <a:p>
+            <a:pPr marL="0" indent="0">
+              <a:buFont typeface="Arial" panose="020B0604020202020204" pitchFamily="34" charset="0"/>
+              <a:buNone/>
+            </a:pPr>
+            <a:r>
+              <a:rPr lang="de-DE" sz="2400" dirty="0" smtClean="0">
+                <a:effectLst>
+                  <a:outerShdw blurRad="38100" dist="38100" dir="2700000" algn="tl">
+                    <a:srgbClr val="000000">
+                      <a:alpha val="43137"/>
+                    </a:srgbClr>
+                  </a:outerShdw>
+                </a:effectLst>
+              </a:rPr>
+              <a:t>Verbesserbar</a:t>
+            </a:r>
+          </a:p>
+          <a:p>
+            <a:r>
+              <a:rPr lang="de-DE" sz="2400" dirty="0" smtClean="0"/>
+              <a:t>Funktionsnamen und Kommentare auf EINER Sprache</a:t>
+            </a:r>
+          </a:p>
+          <a:p>
+            <a:r>
+              <a:rPr lang="de-DE" sz="2400" dirty="0" smtClean="0"/>
+              <a:t>Früher fertig werden zum Testen</a:t>
+            </a:r>
+          </a:p>
+          <a:p>
+            <a:r>
+              <a:rPr lang="de-DE" sz="2400" dirty="0" err="1" smtClean="0"/>
+              <a:t>Issue</a:t>
+            </a:r>
+            <a:r>
+              <a:rPr lang="de-DE" sz="2400" dirty="0" smtClean="0"/>
+              <a:t> System</a:t>
+            </a:r>
+            <a:endParaRPr lang="de-DE" sz="2400" dirty="0"/>
+          </a:p>
+        </p:txBody>
+      </p:sp>
+      <p:sp>
+        <p:nvSpPr>
+          <p:cNvPr id="6" name="Foliennummernplatzhalter 3"/>
+          <p:cNvSpPr txBox="1">
+            <a:spLocks/>
+          </p:cNvSpPr>
+          <p:nvPr/>
+        </p:nvSpPr>
+        <p:spPr>
+          <a:xfrm>
+            <a:off x="8460431" y="6480855"/>
+            <a:ext cx="666315" cy="365125"/>
+          </a:xfrm>
+          <a:prstGeom prst="rect">
+            <a:avLst/>
+          </a:prstGeom>
+        </p:spPr>
+        <p:txBody>
+          <a:bodyPr/>
+          <a:lstStyle>
+            <a:defPPr>
+              <a:defRPr lang="de-DE"/>
+            </a:defPPr>
+            <a:lvl1pPr marL="0" algn="l" defTabSz="914400" rtl="0" eaLnBrk="1" latinLnBrk="0" hangingPunct="1">
+              <a:defRPr sz="1800" kern="1200">
+                <a:solidFill>
+                  <a:schemeClr val="tx1"/>
+                </a:solidFill>
+                <a:latin typeface="+mn-lt"/>
+                <a:ea typeface="+mn-ea"/>
+                <a:cs typeface="+mn-cs"/>
+              </a:defRPr>
+            </a:lvl1pPr>
+            <a:lvl2pPr marL="457200" algn="l" defTabSz="914400" rtl="0" eaLnBrk="1" latinLnBrk="0" hangingPunct="1">
+              <a:defRPr sz="1800" kern="1200">
+                <a:solidFill>
+                  <a:schemeClr val="tx1"/>
+                </a:solidFill>
+                <a:latin typeface="+mn-lt"/>
+                <a:ea typeface="+mn-ea"/>
+                <a:cs typeface="+mn-cs"/>
+              </a:defRPr>
+            </a:lvl2pPr>
+            <a:lvl3pPr marL="914400" algn="l" defTabSz="914400" rtl="0" eaLnBrk="1" latinLnBrk="0" hangingPunct="1">
+              <a:defRPr sz="1800" kern="1200">
+                <a:solidFill>
+                  <a:schemeClr val="tx1"/>
+                </a:solidFill>
+                <a:latin typeface="+mn-lt"/>
+                <a:ea typeface="+mn-ea"/>
+                <a:cs typeface="+mn-cs"/>
+              </a:defRPr>
+            </a:lvl3pPr>
+            <a:lvl4pPr marL="1371600" algn="l" defTabSz="914400" rtl="0" eaLnBrk="1" latinLnBrk="0" hangingPunct="1">
+              <a:defRPr sz="1800" kern="1200">
+                <a:solidFill>
+                  <a:schemeClr val="tx1"/>
+                </a:solidFill>
+                <a:latin typeface="+mn-lt"/>
+                <a:ea typeface="+mn-ea"/>
+                <a:cs typeface="+mn-cs"/>
+              </a:defRPr>
+            </a:lvl4pPr>
+            <a:lvl5pPr marL="1828800" algn="l" defTabSz="914400" rtl="0" eaLnBrk="1" latinLnBrk="0" hangingPunct="1">
+              <a:defRPr sz="1800" kern="1200">
+                <a:solidFill>
+                  <a:schemeClr val="tx1"/>
+                </a:solidFill>
+                <a:latin typeface="+mn-lt"/>
+                <a:ea typeface="+mn-ea"/>
+                <a:cs typeface="+mn-cs"/>
+              </a:defRPr>
+            </a:lvl5pPr>
+            <a:lvl6pPr marL="2286000" algn="l" defTabSz="914400" rtl="0" eaLnBrk="1" latinLnBrk="0" hangingPunct="1">
+              <a:defRPr sz="1800" kern="1200">
+                <a:solidFill>
+                  <a:schemeClr val="tx1"/>
+                </a:solidFill>
+                <a:latin typeface="+mn-lt"/>
+                <a:ea typeface="+mn-ea"/>
+                <a:cs typeface="+mn-cs"/>
+              </a:defRPr>
+            </a:lvl6pPr>
+            <a:lvl7pPr marL="2743200" algn="l" defTabSz="914400" rtl="0" eaLnBrk="1" latinLnBrk="0" hangingPunct="1">
+              <a:defRPr sz="1800" kern="1200">
+                <a:solidFill>
+                  <a:schemeClr val="tx1"/>
+                </a:solidFill>
+                <a:latin typeface="+mn-lt"/>
+                <a:ea typeface="+mn-ea"/>
+                <a:cs typeface="+mn-cs"/>
+              </a:defRPr>
+            </a:lvl7pPr>
+            <a:lvl8pPr marL="3200400" algn="l" defTabSz="914400" rtl="0" eaLnBrk="1" latinLnBrk="0" hangingPunct="1">
+              <a:defRPr sz="1800" kern="1200">
+                <a:solidFill>
+                  <a:schemeClr val="tx1"/>
+                </a:solidFill>
+                <a:latin typeface="+mn-lt"/>
+                <a:ea typeface="+mn-ea"/>
+                <a:cs typeface="+mn-cs"/>
+              </a:defRPr>
+            </a:lvl8pPr>
+            <a:lvl9pPr marL="3657600" algn="l" defTabSz="914400" rtl="0" eaLnBrk="1" latinLnBrk="0" hangingPunct="1">
+              <a:defRPr sz="1800" kern="1200">
+                <a:solidFill>
+                  <a:schemeClr val="tx1"/>
+                </a:solidFill>
+                <a:latin typeface="+mn-lt"/>
+                <a:ea typeface="+mn-ea"/>
+                <a:cs typeface="+mn-cs"/>
+              </a:defRPr>
+            </a:lvl9pPr>
+          </a:lstStyle>
           <a:p>
             <a:fld id="{80A02E86-5D94-48B3-A556-A0859BE28805}" type="slidenum">
               <a:rPr lang="de-DE" sz="1400" smtClean="0">
@@ -6206,6 +7400,7 @@
                   </a:schemeClr>
                 </a:solidFill>
               </a:rPr>
+              <a:pPr/>
               <a:t>9</a:t>
             </a:fld>
             <a:endParaRPr lang="de-DE" sz="1400" dirty="0">
@@ -6216,205 +7411,6 @@
                 </a:schemeClr>
               </a:solidFill>
             </a:endParaRPr>
-          </a:p>
-        </p:txBody>
-      </p:sp>
-      <p:sp>
-        <p:nvSpPr>
-          <p:cNvPr id="5" name="Inhaltsplatzhalter 2"/>
-          <p:cNvSpPr txBox="1">
-            <a:spLocks/>
-          </p:cNvSpPr>
-          <p:nvPr/>
-        </p:nvSpPr>
-        <p:spPr>
-          <a:xfrm>
-            <a:off x="4572000" y="1556792"/>
-            <a:ext cx="4320480" cy="4597971"/>
-          </a:xfrm>
-          <a:prstGeom prst="rect">
-            <a:avLst/>
-          </a:prstGeom>
-        </p:spPr>
-        <p:txBody>
-          <a:bodyPr/>
-          <a:lstStyle>
-            <a:lvl1pPr marL="342900" indent="-342900" algn="l" defTabSz="914400" rtl="0" eaLnBrk="1" latinLnBrk="0" hangingPunct="1">
-              <a:spcBef>
-                <a:spcPct val="20000"/>
-              </a:spcBef>
-              <a:buFont typeface="Arial" panose="020B0604020202020204" pitchFamily="34" charset="0"/>
-              <a:buChar char="•"/>
-              <a:defRPr sz="3200" kern="1200">
-                <a:solidFill>
-                  <a:schemeClr val="tx1"/>
-                </a:solidFill>
-                <a:latin typeface="+mn-lt"/>
-                <a:ea typeface="+mn-ea"/>
-                <a:cs typeface="+mn-cs"/>
-              </a:defRPr>
-            </a:lvl1pPr>
-            <a:lvl2pPr marL="742950" indent="-285750" algn="l" defTabSz="914400" rtl="0" eaLnBrk="1" latinLnBrk="0" hangingPunct="1">
-              <a:spcBef>
-                <a:spcPct val="20000"/>
-              </a:spcBef>
-              <a:buFont typeface="Arial" panose="020B0604020202020204" pitchFamily="34" charset="0"/>
-              <a:buChar char="–"/>
-              <a:defRPr sz="2800" kern="1200">
-                <a:solidFill>
-                  <a:schemeClr val="tx1"/>
-                </a:solidFill>
-                <a:latin typeface="+mn-lt"/>
-                <a:ea typeface="+mn-ea"/>
-                <a:cs typeface="+mn-cs"/>
-              </a:defRPr>
-            </a:lvl2pPr>
-            <a:lvl3pPr marL="1143000" indent="-228600" algn="l" defTabSz="914400" rtl="0" eaLnBrk="1" latinLnBrk="0" hangingPunct="1">
-              <a:spcBef>
-                <a:spcPct val="20000"/>
-              </a:spcBef>
-              <a:buFont typeface="Arial" panose="020B0604020202020204" pitchFamily="34" charset="0"/>
-              <a:buChar char="•"/>
-              <a:defRPr sz="2400" kern="1200">
-                <a:solidFill>
-                  <a:schemeClr val="tx1"/>
-                </a:solidFill>
-                <a:latin typeface="+mn-lt"/>
-                <a:ea typeface="+mn-ea"/>
-                <a:cs typeface="+mn-cs"/>
-              </a:defRPr>
-            </a:lvl3pPr>
-            <a:lvl4pPr marL="1600200" indent="-228600" algn="l" defTabSz="914400" rtl="0" eaLnBrk="1" latinLnBrk="0" hangingPunct="1">
-              <a:spcBef>
-                <a:spcPct val="20000"/>
-              </a:spcBef>
-              <a:buFont typeface="Arial" panose="020B0604020202020204" pitchFamily="34" charset="0"/>
-              <a:buChar char="–"/>
-              <a:defRPr sz="2000" kern="1200">
-                <a:solidFill>
-                  <a:schemeClr val="tx1"/>
-                </a:solidFill>
-                <a:latin typeface="+mn-lt"/>
-                <a:ea typeface="+mn-ea"/>
-                <a:cs typeface="+mn-cs"/>
-              </a:defRPr>
-            </a:lvl4pPr>
-            <a:lvl5pPr marL="2057400" indent="-228600" algn="l" defTabSz="914400" rtl="0" eaLnBrk="1" latinLnBrk="0" hangingPunct="1">
-              <a:spcBef>
-                <a:spcPct val="20000"/>
-              </a:spcBef>
-              <a:buFont typeface="Arial" panose="020B0604020202020204" pitchFamily="34" charset="0"/>
-              <a:buChar char="»"/>
-              <a:defRPr sz="2000" kern="1200">
-                <a:solidFill>
-                  <a:schemeClr val="tx1"/>
-                </a:solidFill>
-                <a:latin typeface="+mn-lt"/>
-                <a:ea typeface="+mn-ea"/>
-                <a:cs typeface="+mn-cs"/>
-              </a:defRPr>
-            </a:lvl5pPr>
-            <a:lvl6pPr marL="2514600" indent="-228600" algn="l" defTabSz="914400" rtl="0" eaLnBrk="1" latinLnBrk="0" hangingPunct="1">
-              <a:spcBef>
-                <a:spcPct val="20000"/>
-              </a:spcBef>
-              <a:buFont typeface="Arial" panose="020B0604020202020204" pitchFamily="34" charset="0"/>
-              <a:buChar char="•"/>
-              <a:defRPr sz="2000" kern="1200">
-                <a:solidFill>
-                  <a:schemeClr val="tx1"/>
-                </a:solidFill>
-                <a:latin typeface="+mn-lt"/>
-                <a:ea typeface="+mn-ea"/>
-                <a:cs typeface="+mn-cs"/>
-              </a:defRPr>
-            </a:lvl6pPr>
-            <a:lvl7pPr marL="2971800" indent="-228600" algn="l" defTabSz="914400" rtl="0" eaLnBrk="1" latinLnBrk="0" hangingPunct="1">
-              <a:spcBef>
-                <a:spcPct val="20000"/>
-              </a:spcBef>
-              <a:buFont typeface="Arial" panose="020B0604020202020204" pitchFamily="34" charset="0"/>
-              <a:buChar char="•"/>
-              <a:defRPr sz="2000" kern="1200">
-                <a:solidFill>
-                  <a:schemeClr val="tx1"/>
-                </a:solidFill>
-                <a:latin typeface="+mn-lt"/>
-                <a:ea typeface="+mn-ea"/>
-                <a:cs typeface="+mn-cs"/>
-              </a:defRPr>
-            </a:lvl7pPr>
-            <a:lvl8pPr marL="3429000" indent="-228600" algn="l" defTabSz="914400" rtl="0" eaLnBrk="1" latinLnBrk="0" hangingPunct="1">
-              <a:spcBef>
-                <a:spcPct val="20000"/>
-              </a:spcBef>
-              <a:buFont typeface="Arial" panose="020B0604020202020204" pitchFamily="34" charset="0"/>
-              <a:buChar char="•"/>
-              <a:defRPr sz="2000" kern="1200">
-                <a:solidFill>
-                  <a:schemeClr val="tx1"/>
-                </a:solidFill>
-                <a:latin typeface="+mn-lt"/>
-                <a:ea typeface="+mn-ea"/>
-                <a:cs typeface="+mn-cs"/>
-              </a:defRPr>
-            </a:lvl8pPr>
-            <a:lvl9pPr marL="3886200" indent="-228600" algn="l" defTabSz="914400" rtl="0" eaLnBrk="1" latinLnBrk="0" hangingPunct="1">
-              <a:spcBef>
-                <a:spcPct val="20000"/>
-              </a:spcBef>
-              <a:buFont typeface="Arial" panose="020B0604020202020204" pitchFamily="34" charset="0"/>
-              <a:buChar char="•"/>
-              <a:defRPr sz="2000" kern="1200">
-                <a:solidFill>
-                  <a:schemeClr val="tx1"/>
-                </a:solidFill>
-                <a:latin typeface="+mn-lt"/>
-                <a:ea typeface="+mn-ea"/>
-                <a:cs typeface="+mn-cs"/>
-              </a:defRPr>
-            </a:lvl9pPr>
-          </a:lstStyle>
-          <a:p>
-            <a:pPr marL="0" indent="0">
-              <a:buFont typeface="Arial" panose="020B0604020202020204" pitchFamily="34" charset="0"/>
-              <a:buNone/>
-            </a:pPr>
-            <a:r>
-              <a:rPr lang="de-DE" sz="2400" dirty="0" smtClean="0">
-                <a:effectLst>
-                  <a:outerShdw blurRad="38100" dist="38100" dir="2700000" algn="tl">
-                    <a:srgbClr val="000000">
-                      <a:alpha val="43137"/>
-                    </a:srgbClr>
-                  </a:outerShdw>
-                </a:effectLst>
-              </a:rPr>
-              <a:t>Verbesserbar</a:t>
-            </a:r>
-          </a:p>
-          <a:p>
-            <a:r>
-              <a:rPr lang="de-DE" sz="2400" dirty="0" smtClean="0"/>
-              <a:t>Funktionsnamen und Kommentare auf EINER Sprache</a:t>
-            </a:r>
-          </a:p>
-          <a:p>
-            <a:r>
-              <a:rPr lang="de-DE" sz="2400" dirty="0" smtClean="0"/>
-              <a:t>Früher fertig werden zum Testen</a:t>
-            </a:r>
-          </a:p>
-          <a:p>
-            <a:r>
-              <a:rPr lang="de-DE" sz="2400" dirty="0" err="1" smtClean="0"/>
-              <a:t>Issue</a:t>
-            </a:r>
-            <a:r>
-              <a:rPr lang="de-DE" sz="2400" dirty="0" smtClean="0"/>
-              <a:t> System</a:t>
-            </a:r>
-            <a:endParaRPr lang="de-DE" sz="2400" dirty="0"/>
           </a:p>
         </p:txBody>
       </p:sp>

</xml_diff>

<commit_message>
Feindesign fertig und abgegeben, Präsentation weiter entwickelt
</commit_message>
<xml_diff>
--- a/Sonstiges/PräsentationSoftBed.pptx
+++ b/Sonstiges/PräsentationSoftBed.pptx
@@ -6417,6 +6417,57 @@
           </a:p>
         </p:txBody>
       </p:sp>
+      <p:pic>
+        <p:nvPicPr>
+          <p:cNvPr id="1026" name="Picture 2" descr="F:\Dokumente\Uni bzw. Hochschule\Hochschule Offenburg\AI4_SS2019\Projekt 1\SoftBed\Design\Klassendiagram\Klassendiagramm_19_06_19.jpg"/>
+          <p:cNvPicPr>
+            <a:picLocks noChangeAspect="1" noChangeArrowheads="1"/>
+          </p:cNvPicPr>
+          <p:nvPr/>
+        </p:nvPicPr>
+        <p:blipFill>
+          <a:blip r:embed="rId2">
+            <a:clrChange>
+              <a:clrFrom>
+                <a:srgbClr val="FFFFFF"/>
+              </a:clrFrom>
+              <a:clrTo>
+                <a:srgbClr val="FFFFFF">
+                  <a:alpha val="0"/>
+                </a:srgbClr>
+              </a:clrTo>
+            </a:clrChange>
+            <a:extLst>
+              <a:ext uri="{28A0092B-C50C-407E-A947-70E740481C1C}">
+                <a14:useLocalDpi xmlns:a14="http://schemas.microsoft.com/office/drawing/2010/main" val="0"/>
+              </a:ext>
+            </a:extLst>
+          </a:blip>
+          <a:srcRect/>
+          <a:stretch>
+            <a:fillRect/>
+          </a:stretch>
+        </p:blipFill>
+        <p:spPr bwMode="auto">
+          <a:xfrm>
+            <a:off x="179512" y="1912374"/>
+            <a:ext cx="8712968" cy="3942498"/>
+          </a:xfrm>
+          <a:prstGeom prst="rect">
+            <a:avLst/>
+          </a:prstGeom>
+          <a:noFill/>
+          <a:extLst>
+            <a:ext uri="{909E8E84-426E-40DD-AFC4-6F175D3DCCD1}">
+              <a14:hiddenFill xmlns:a14="http://schemas.microsoft.com/office/drawing/2010/main">
+                <a:solidFill>
+                  <a:srgbClr val="FFFFFF"/>
+                </a:solidFill>
+              </a14:hiddenFill>
+            </a:ext>
+          </a:extLst>
+        </p:spPr>
+      </p:pic>
     </p:spTree>
     <p:extLst>
       <p:ext uri="{BB962C8B-B14F-4D97-AF65-F5344CB8AC3E}">
@@ -7053,7 +7104,6 @@
               <a:rPr lang="de-DE" sz="2400" dirty="0" smtClean="0"/>
               <a:t>Kontinuierliches Arbeiten</a:t>
             </a:r>
-            <a:endParaRPr lang="de-DE" sz="2400" dirty="0" smtClean="0"/>
           </a:p>
           <a:p>
             <a:r>
@@ -7068,7 +7118,6 @@
               <a:rPr lang="de-DE" sz="2400" dirty="0" smtClean="0"/>
               <a:t>-Treffen</a:t>
             </a:r>
-            <a:endParaRPr lang="de-DE" sz="2400" dirty="0" smtClean="0"/>
           </a:p>
           <a:p>
             <a:r>

</xml_diff>